<commit_message>
Last minute slide additions
</commit_message>
<xml_diff>
--- a/meeting-10-14-16/Clustering-Educational-Data-Mining.pptx
+++ b/meeting-10-14-16/Clustering-Educational-Data-Mining.pptx
@@ -11,11 +11,12 @@
     <p:sldId id="262" r:id="rId5"/>
     <p:sldId id="257" r:id="rId6"/>
     <p:sldId id="268" r:id="rId7"/>
-    <p:sldId id="265" r:id="rId8"/>
-    <p:sldId id="260" r:id="rId9"/>
-    <p:sldId id="266" r:id="rId10"/>
-    <p:sldId id="267" r:id="rId11"/>
-    <p:sldId id="264" r:id="rId12"/>
+    <p:sldId id="270" r:id="rId8"/>
+    <p:sldId id="265" r:id="rId9"/>
+    <p:sldId id="260" r:id="rId10"/>
+    <p:sldId id="266" r:id="rId11"/>
+    <p:sldId id="267" r:id="rId12"/>
+    <p:sldId id="264" r:id="rId13"/>
   </p:sldIdLst>
   <p:sldSz cx="12192000" cy="6858000"/>
   <p:notesSz cx="6858000" cy="9144000"/>
@@ -359,7 +360,7 @@
           <a:p>
             <a:fld id="{23635EF2-D4EE-4219-9D35-F8FC2DDED29E}" type="datetimeFigureOut">
               <a:rPr lang="en-US" smtClean="0"/>
-              <a:t>10/13/2016</a:t>
+              <a:t>10/14/2016</a:t>
             </a:fld>
             <a:endParaRPr lang="en-US"/>
           </a:p>
@@ -567,7 +568,7 @@
           <a:p>
             <a:fld id="{23635EF2-D4EE-4219-9D35-F8FC2DDED29E}" type="datetimeFigureOut">
               <a:rPr lang="en-US" smtClean="0"/>
-              <a:t>10/13/2016</a:t>
+              <a:t>10/14/2016</a:t>
             </a:fld>
             <a:endParaRPr lang="en-US"/>
           </a:p>
@@ -823,7 +824,7 @@
           <a:p>
             <a:fld id="{23635EF2-D4EE-4219-9D35-F8FC2DDED29E}" type="datetimeFigureOut">
               <a:rPr lang="en-US" smtClean="0"/>
-              <a:t>10/13/2016</a:t>
+              <a:t>10/14/2016</a:t>
             </a:fld>
             <a:endParaRPr lang="en-US"/>
           </a:p>
@@ -997,7 +998,7 @@
           <a:p>
             <a:fld id="{23635EF2-D4EE-4219-9D35-F8FC2DDED29E}" type="datetimeFigureOut">
               <a:rPr lang="en-US" smtClean="0"/>
-              <a:t>10/13/2016</a:t>
+              <a:t>10/14/2016</a:t>
             </a:fld>
             <a:endParaRPr lang="en-US"/>
           </a:p>
@@ -1340,7 +1341,7 @@
           <a:p>
             <a:fld id="{23635EF2-D4EE-4219-9D35-F8FC2DDED29E}" type="datetimeFigureOut">
               <a:rPr lang="en-US" smtClean="0"/>
-              <a:t>10/13/2016</a:t>
+              <a:t>10/14/2016</a:t>
             </a:fld>
             <a:endParaRPr lang="en-US"/>
           </a:p>
@@ -1615,7 +1616,7 @@
           <a:p>
             <a:fld id="{23635EF2-D4EE-4219-9D35-F8FC2DDED29E}" type="datetimeFigureOut">
               <a:rPr lang="en-US" smtClean="0"/>
-              <a:t>10/13/2016</a:t>
+              <a:t>10/14/2016</a:t>
             </a:fld>
             <a:endParaRPr lang="en-US"/>
           </a:p>
@@ -1994,7 +1995,7 @@
           <a:p>
             <a:fld id="{23635EF2-D4EE-4219-9D35-F8FC2DDED29E}" type="datetimeFigureOut">
               <a:rPr lang="en-US" smtClean="0"/>
-              <a:t>10/13/2016</a:t>
+              <a:t>10/14/2016</a:t>
             </a:fld>
             <a:endParaRPr lang="en-US"/>
           </a:p>
@@ -2112,7 +2113,7 @@
           <a:p>
             <a:fld id="{23635EF2-D4EE-4219-9D35-F8FC2DDED29E}" type="datetimeFigureOut">
               <a:rPr lang="en-US" smtClean="0"/>
-              <a:t>10/13/2016</a:t>
+              <a:t>10/14/2016</a:t>
             </a:fld>
             <a:endParaRPr lang="en-US"/>
           </a:p>
@@ -2283,7 +2284,7 @@
           <a:p>
             <a:fld id="{23635EF2-D4EE-4219-9D35-F8FC2DDED29E}" type="datetimeFigureOut">
               <a:rPr lang="en-US" smtClean="0"/>
-              <a:t>10/13/2016</a:t>
+              <a:t>10/14/2016</a:t>
             </a:fld>
             <a:endParaRPr lang="en-US"/>
           </a:p>
@@ -2637,7 +2638,7 @@
           <a:p>
             <a:fld id="{23635EF2-D4EE-4219-9D35-F8FC2DDED29E}" type="datetimeFigureOut">
               <a:rPr lang="en-US" smtClean="0"/>
-              <a:t>10/13/2016</a:t>
+              <a:t>10/14/2016</a:t>
             </a:fld>
             <a:endParaRPr lang="en-US"/>
           </a:p>
@@ -3019,7 +3020,7 @@
           <a:p>
             <a:fld id="{23635EF2-D4EE-4219-9D35-F8FC2DDED29E}" type="datetimeFigureOut">
               <a:rPr lang="en-US" smtClean="0"/>
-              <a:t>10/13/2016</a:t>
+              <a:t>10/14/2016</a:t>
             </a:fld>
             <a:endParaRPr lang="en-US"/>
           </a:p>
@@ -3306,7 +3307,7 @@
           <a:p>
             <a:fld id="{23635EF2-D4EE-4219-9D35-F8FC2DDED29E}" type="datetimeFigureOut">
               <a:rPr lang="en-US" smtClean="0"/>
-              <a:t>10/13/2016</a:t>
+              <a:t>10/14/2016</a:t>
             </a:fld>
             <a:endParaRPr lang="en-US"/>
           </a:p>
@@ -3933,6 +3934,97 @@
           <a:bodyPr/>
           <a:lstStyle/>
           <a:p>
+            <a:endParaRPr lang="en-US"/>
+          </a:p>
+        </p:txBody>
+      </p:sp>
+      <p:pic>
+        <p:nvPicPr>
+          <p:cNvPr id="2050" name="Picture 2" descr="../_images/sphx_glr_plot_cluster_comparison_0011.png"/>
+          <p:cNvPicPr>
+            <a:picLocks noGrp="1" noChangeAspect="1" noChangeArrowheads="1"/>
+          </p:cNvPicPr>
+          <p:nvPr>
+            <p:ph idx="1"/>
+          </p:nvPr>
+        </p:nvPicPr>
+        <p:blipFill>
+          <a:blip r:embed="rId2">
+            <a:extLst>
+              <a:ext uri="{28A0092B-C50C-407E-A947-70E740481C1C}">
+                <a14:useLocalDpi xmlns:a14="http://schemas.microsoft.com/office/drawing/2010/main" val="0"/>
+              </a:ext>
+            </a:extLst>
+          </a:blip>
+          <a:stretch>
+            <a:fillRect/>
+          </a:stretch>
+        </p:blipFill>
+        <p:spPr bwMode="auto">
+          <a:xfrm>
+            <a:off x="2103438" y="1846263"/>
+            <a:ext cx="8045450" cy="4022725"/>
+          </a:xfrm>
+          <a:prstGeom prst="rect">
+            <a:avLst/>
+          </a:prstGeom>
+          <a:noFill/>
+          <a:extLst>
+            <a:ext uri="{909E8E84-426E-40DD-AFC4-6F175D3DCCD1}">
+              <a14:hiddenFill xmlns:a14="http://schemas.microsoft.com/office/drawing/2010/main">
+                <a:solidFill>
+                  <a:srgbClr val="FFFFFF"/>
+                </a:solidFill>
+              </a14:hiddenFill>
+            </a:ext>
+          </a:extLst>
+        </p:spPr>
+      </p:pic>
+    </p:spTree>
+    <p:extLst>
+      <p:ext uri="{BB962C8B-B14F-4D97-AF65-F5344CB8AC3E}">
+        <p14:creationId xmlns:p14="http://schemas.microsoft.com/office/powerpoint/2010/main" val="2194670105"/>
+      </p:ext>
+    </p:extLst>
+  </p:cSld>
+  <p:clrMapOvr>
+    <a:masterClrMapping/>
+  </p:clrMapOvr>
+</p:sld>
+</file>
+
+<file path=ppt/slides/slide11.xml><?xml version="1.0" encoding="utf-8"?>
+<p:sld xmlns:a="http://schemas.openxmlformats.org/drawingml/2006/main" xmlns:r="http://schemas.openxmlformats.org/officeDocument/2006/relationships" xmlns:p="http://schemas.openxmlformats.org/presentationml/2006/main">
+  <p:cSld>
+    <p:spTree>
+      <p:nvGrpSpPr>
+        <p:cNvPr id="1" name=""/>
+        <p:cNvGrpSpPr/>
+        <p:nvPr/>
+      </p:nvGrpSpPr>
+      <p:grpSpPr>
+        <a:xfrm>
+          <a:off x="0" y="0"/>
+          <a:ext cx="0" cy="0"/>
+          <a:chOff x="0" y="0"/>
+          <a:chExt cx="0" cy="0"/>
+        </a:xfrm>
+      </p:grpSpPr>
+      <p:sp>
+        <p:nvSpPr>
+          <p:cNvPr id="2" name="Title 1"/>
+          <p:cNvSpPr>
+            <a:spLocks noGrp="1"/>
+          </p:cNvSpPr>
+          <p:nvPr>
+            <p:ph type="title"/>
+          </p:nvPr>
+        </p:nvSpPr>
+        <p:spPr/>
+        <p:txBody>
+          <a:bodyPr/>
+          <a:lstStyle/>
+          <a:p>
             <a:r>
               <a:rPr lang="en-US" dirty="0"/>
               <a:t>Let’s talk about our data</a:t>
@@ -3987,7 +4079,7 @@
 </p:sld>
 </file>
 
-<file path=ppt/slides/slide11.xml><?xml version="1.0" encoding="utf-8"?>
+<file path=ppt/slides/slide12.xml><?xml version="1.0" encoding="utf-8"?>
 <p:sld xmlns:a="http://schemas.openxmlformats.org/drawingml/2006/main" xmlns:r="http://schemas.openxmlformats.org/officeDocument/2006/relationships" xmlns:p="http://schemas.openxmlformats.org/presentationml/2006/main">
   <p:cSld>
     <p:spTree>
@@ -4387,6 +4479,12 @@
               <a:t>Minimize intra-distance, maximize inter-distance</a:t>
             </a:r>
           </a:p>
+          <a:p>
+            <a:r>
+              <a:rPr lang="en-US" dirty="0"/>
+              <a:t>Typically, optimizes using Euclidean distance</a:t>
+            </a:r>
+          </a:p>
         </p:txBody>
       </p:sp>
     </p:spTree>
@@ -4476,11 +4574,7 @@
             <a:pPr lvl="1"/>
             <a:r>
               <a:rPr lang="en-US" dirty="0"/>
-              <a:t>BIC (</a:t>
-            </a:r>
-            <a:r>
-              <a:rPr lang="en-US" dirty="0"/>
-              <a:t>Bayesian Information Criterion)</a:t>
+              <a:t>BIC (Bayesian Information Criterion)</a:t>
             </a:r>
           </a:p>
           <a:p>
@@ -4643,8 +4737,12 @@
           <a:lstStyle/>
           <a:p>
             <a:r>
+              <a:rPr lang="en-US" dirty="0" err="1"/>
+              <a:t>KMeans</a:t>
+            </a:r>
+            <a:r>
               <a:rPr lang="en-US" dirty="0"/>
-              <a:t>Starting</a:t>
+              <a:t> Questions</a:t>
             </a:r>
           </a:p>
         </p:txBody>
@@ -4666,13 +4764,29 @@
           <a:p>
             <a:r>
               <a:rPr lang="en-US" dirty="0"/>
-              <a:t>Typically, Random</a:t>
-            </a:r>
-          </a:p>
-          <a:p>
+              <a:t>What to do about categorical data?</a:t>
+            </a:r>
+          </a:p>
+          <a:p>
+            <a:pPr lvl="1"/>
             <a:r>
               <a:rPr lang="en-US" dirty="0"/>
-              <a:t>Or initial values if you have priors</a:t>
+              <a:t>Use a different algorithm, e.g., K-Modes</a:t>
+            </a:r>
+          </a:p>
+          <a:p>
+            <a:pPr lvl="2"/>
+            <a:r>
+              <a:rPr lang="en-US" dirty="0"/>
+              <a:t>http://www.cs.ust.hk/~qyang/Teaching/537/Papers/huang98extensions.pdf</a:t>
+            </a:r>
+            <a:endParaRPr lang="en-US" dirty="0"/>
+          </a:p>
+          <a:p>
+            <a:pPr lvl="1"/>
+            <a:r>
+              <a:rPr lang="en-US" dirty="0"/>
+              <a:t>Hamming distance instead of Euclidean distance</a:t>
             </a:r>
           </a:p>
         </p:txBody>
@@ -4680,7 +4794,7 @@
     </p:spTree>
     <p:extLst>
       <p:ext uri="{BB962C8B-B14F-4D97-AF65-F5344CB8AC3E}">
-        <p14:creationId xmlns:p14="http://schemas.microsoft.com/office/powerpoint/2010/main" val="1264731278"/>
+        <p14:creationId xmlns:p14="http://schemas.microsoft.com/office/powerpoint/2010/main" val="2296319599"/>
       </p:ext>
     </p:extLst>
   </p:cSld>
@@ -4723,6 +4837,98 @@
           <a:lstStyle/>
           <a:p>
             <a:r>
+              <a:rPr lang="en-US" dirty="0" err="1"/>
+              <a:t>KMeans</a:t>
+            </a:r>
+            <a:r>
+              <a:rPr lang="en-US" dirty="0"/>
+              <a:t> Questions?</a:t>
+            </a:r>
+          </a:p>
+        </p:txBody>
+      </p:sp>
+      <p:sp>
+        <p:nvSpPr>
+          <p:cNvPr id="3" name="Content Placeholder 2"/>
+          <p:cNvSpPr>
+            <a:spLocks noGrp="1"/>
+          </p:cNvSpPr>
+          <p:nvPr>
+            <p:ph idx="1"/>
+          </p:nvPr>
+        </p:nvSpPr>
+        <p:spPr/>
+        <p:txBody>
+          <a:bodyPr/>
+          <a:lstStyle/>
+          <a:p>
+            <a:r>
+              <a:rPr lang="en-US" dirty="0"/>
+              <a:t>What should I initialize with?</a:t>
+            </a:r>
+          </a:p>
+          <a:p>
+            <a:pPr lvl="1"/>
+            <a:r>
+              <a:rPr lang="en-US" dirty="0"/>
+              <a:t>Typically, random is fine</a:t>
+            </a:r>
+          </a:p>
+          <a:p>
+            <a:pPr lvl="1"/>
+            <a:r>
+              <a:rPr lang="en-US" dirty="0"/>
+              <a:t>Or initial values if you have priors</a:t>
+            </a:r>
+          </a:p>
+        </p:txBody>
+      </p:sp>
+    </p:spTree>
+    <p:extLst>
+      <p:ext uri="{BB962C8B-B14F-4D97-AF65-F5344CB8AC3E}">
+        <p14:creationId xmlns:p14="http://schemas.microsoft.com/office/powerpoint/2010/main" val="1264731278"/>
+      </p:ext>
+    </p:extLst>
+  </p:cSld>
+  <p:clrMapOvr>
+    <a:masterClrMapping/>
+  </p:clrMapOvr>
+</p:sld>
+</file>
+
+<file path=ppt/slides/slide9.xml><?xml version="1.0" encoding="utf-8"?>
+<p:sld xmlns:a="http://schemas.openxmlformats.org/drawingml/2006/main" xmlns:r="http://schemas.openxmlformats.org/officeDocument/2006/relationships" xmlns:p="http://schemas.openxmlformats.org/presentationml/2006/main">
+  <p:cSld>
+    <p:spTree>
+      <p:nvGrpSpPr>
+        <p:cNvPr id="1" name=""/>
+        <p:cNvGrpSpPr/>
+        <p:nvPr/>
+      </p:nvGrpSpPr>
+      <p:grpSpPr>
+        <a:xfrm>
+          <a:off x="0" y="0"/>
+          <a:ext cx="0" cy="0"/>
+          <a:chOff x="0" y="0"/>
+          <a:chExt cx="0" cy="0"/>
+        </a:xfrm>
+      </p:grpSpPr>
+      <p:sp>
+        <p:nvSpPr>
+          <p:cNvPr id="2" name="Title 1"/>
+          <p:cNvSpPr>
+            <a:spLocks noGrp="1"/>
+          </p:cNvSpPr>
+          <p:nvPr>
+            <p:ph type="title"/>
+          </p:nvPr>
+        </p:nvSpPr>
+        <p:spPr/>
+        <p:txBody>
+          <a:bodyPr/>
+          <a:lstStyle/>
+          <a:p>
+            <a:r>
               <a:rPr lang="en-US" dirty="0"/>
               <a:t>Sample Datasets</a:t>
             </a:r>
@@ -4746,13 +4952,8 @@
           <a:p>
             <a:r>
               <a:rPr lang="en-US" dirty="0"/>
-              <a:t>VT CS Department Grades (</a:t>
-            </a:r>
-            <a:r>
-              <a:rPr lang="en-US" dirty="0"/>
-              <a:t>http://ir.vt.edu/data/courseGrade.html)</a:t>
-            </a:r>
-            <a:endParaRPr lang="en-US" dirty="0"/>
+              <a:t>VT CS Department Grades (http://ir.vt.edu/data/courseGrade.html)</a:t>
+            </a:r>
           </a:p>
         </p:txBody>
       </p:sp>
@@ -6285,97 +6486,6 @@
 </p:sld>
 </file>
 
-<file path=ppt/slides/slide9.xml><?xml version="1.0" encoding="utf-8"?>
-<p:sld xmlns:a="http://schemas.openxmlformats.org/drawingml/2006/main" xmlns:r="http://schemas.openxmlformats.org/officeDocument/2006/relationships" xmlns:p="http://schemas.openxmlformats.org/presentationml/2006/main">
-  <p:cSld>
-    <p:spTree>
-      <p:nvGrpSpPr>
-        <p:cNvPr id="1" name=""/>
-        <p:cNvGrpSpPr/>
-        <p:nvPr/>
-      </p:nvGrpSpPr>
-      <p:grpSpPr>
-        <a:xfrm>
-          <a:off x="0" y="0"/>
-          <a:ext cx="0" cy="0"/>
-          <a:chOff x="0" y="0"/>
-          <a:chExt cx="0" cy="0"/>
-        </a:xfrm>
-      </p:grpSpPr>
-      <p:sp>
-        <p:nvSpPr>
-          <p:cNvPr id="2" name="Title 1"/>
-          <p:cNvSpPr>
-            <a:spLocks noGrp="1"/>
-          </p:cNvSpPr>
-          <p:nvPr>
-            <p:ph type="title"/>
-          </p:nvPr>
-        </p:nvSpPr>
-        <p:spPr/>
-        <p:txBody>
-          <a:bodyPr/>
-          <a:lstStyle/>
-          <a:p>
-            <a:endParaRPr lang="en-US"/>
-          </a:p>
-        </p:txBody>
-      </p:sp>
-      <p:pic>
-        <p:nvPicPr>
-          <p:cNvPr id="2050" name="Picture 2" descr="../_images/sphx_glr_plot_cluster_comparison_0011.png"/>
-          <p:cNvPicPr>
-            <a:picLocks noGrp="1" noChangeAspect="1" noChangeArrowheads="1"/>
-          </p:cNvPicPr>
-          <p:nvPr>
-            <p:ph idx="1"/>
-          </p:nvPr>
-        </p:nvPicPr>
-        <p:blipFill>
-          <a:blip r:embed="rId2">
-            <a:extLst>
-              <a:ext uri="{28A0092B-C50C-407E-A947-70E740481C1C}">
-                <a14:useLocalDpi xmlns:a14="http://schemas.microsoft.com/office/drawing/2010/main" val="0"/>
-              </a:ext>
-            </a:extLst>
-          </a:blip>
-          <a:stretch>
-            <a:fillRect/>
-          </a:stretch>
-        </p:blipFill>
-        <p:spPr bwMode="auto">
-          <a:xfrm>
-            <a:off x="2103438" y="1846263"/>
-            <a:ext cx="8045450" cy="4022725"/>
-          </a:xfrm>
-          <a:prstGeom prst="rect">
-            <a:avLst/>
-          </a:prstGeom>
-          <a:noFill/>
-          <a:extLst>
-            <a:ext uri="{909E8E84-426E-40DD-AFC4-6F175D3DCCD1}">
-              <a14:hiddenFill xmlns:a14="http://schemas.microsoft.com/office/drawing/2010/main">
-                <a:solidFill>
-                  <a:srgbClr val="FFFFFF"/>
-                </a:solidFill>
-              </a14:hiddenFill>
-            </a:ext>
-          </a:extLst>
-        </p:spPr>
-      </p:pic>
-    </p:spTree>
-    <p:extLst>
-      <p:ext uri="{BB962C8B-B14F-4D97-AF65-F5344CB8AC3E}">
-        <p14:creationId xmlns:p14="http://schemas.microsoft.com/office/powerpoint/2010/main" val="2194670105"/>
-      </p:ext>
-    </p:extLst>
-  </p:cSld>
-  <p:clrMapOvr>
-    <a:masterClrMapping/>
-  </p:clrMapOvr>
-</p:sld>
-</file>
-
 <file path=ppt/theme/theme1.xml><?xml version="1.0" encoding="utf-8"?>
 <a:theme xmlns:a="http://schemas.openxmlformats.org/drawingml/2006/main" name="Retrospect">
   <a:themeElements>

</xml_diff>